<commit_message>
start working on sorting
</commit_message>
<xml_diff>
--- a/sprints/Sprint 9 - Dec 25 - Dec 31 - Review.pptx
+++ b/sprints/Sprint 9 - Dec 25 - Dec 31 - Review.pptx
@@ -554,7 +554,7 @@
             <a:fld id="{81331B57-0BE5-4F82-AA58-76F53EFF3ADA}" type="datetime8">
               <a:rPr lang="en-US" smtClean="0"/>
               <a:pPr/>
-              <a:t>12/31/2016 9:41 PM</a:t>
+              <a:t>12/31/2016 9:54 PM</a:t>
             </a:fld>
             <a:endParaRPr lang="en-US" dirty="0"/>
           </a:p>
@@ -749,7 +749,7 @@
             <a:fld id="{81331B57-0BE5-4F82-AA58-76F53EFF3ADA}" type="datetime8">
               <a:rPr lang="en-US" smtClean="0"/>
               <a:pPr/>
-              <a:t>12/31/2016 9:41 PM</a:t>
+              <a:t>12/31/2016 9:54 PM</a:t>
             </a:fld>
             <a:endParaRPr lang="en-US"/>
           </a:p>
@@ -934,7 +934,7 @@
             <a:fld id="{81331B57-0BE5-4F82-AA58-76F53EFF3ADA}" type="datetime8">
               <a:rPr lang="en-US" smtClean="0"/>
               <a:pPr/>
-              <a:t>12/31/2016 9:42 PM</a:t>
+              <a:t>12/31/2016 9:54 PM</a:t>
             </a:fld>
             <a:endParaRPr lang="en-US"/>
           </a:p>
@@ -1119,7 +1119,7 @@
             <a:fld id="{81331B57-0BE5-4F82-AA58-76F53EFF3ADA}" type="datetime8">
               <a:rPr lang="en-US" smtClean="0"/>
               <a:pPr/>
-              <a:t>12/31/2016 9:42 PM</a:t>
+              <a:t>12/31/2016 9:54 PM</a:t>
             </a:fld>
             <a:endParaRPr lang="en-US"/>
           </a:p>
@@ -1304,7 +1304,7 @@
             <a:fld id="{81331B57-0BE5-4F82-AA58-76F53EFF3ADA}" type="datetime8">
               <a:rPr lang="en-US" smtClean="0"/>
               <a:pPr/>
-              <a:t>12/31/2016 9:42 PM</a:t>
+              <a:t>12/31/2016 9:54 PM</a:t>
             </a:fld>
             <a:endParaRPr lang="en-US"/>
           </a:p>
@@ -4768,17 +4768,7 @@
                   </a:schemeClr>
                 </a:solidFill>
               </a:rPr>
-              <a:t>( 2 story pts </a:t>
-            </a:r>
-            <a:r>
-              <a:rPr lang="en-US" dirty="0" smtClean="0">
-                <a:solidFill>
-                  <a:schemeClr val="tx1">
-                    <a:lumMod val="65000"/>
-                  </a:schemeClr>
-                </a:solidFill>
-              </a:rPr>
-              <a:t>) – 100%</a:t>
+              <a:t>( 2 story pts ) – 100%</a:t>
             </a:r>
             <a:endParaRPr lang="en-US" dirty="0">
               <a:solidFill>
@@ -5028,13 +5018,8 @@
           <a:p>
             <a:r>
               <a:rPr lang="en-US" dirty="0" smtClean="0"/>
-              <a:t>Expand Index for find() and remove() to handle multiple matches</a:t>
-            </a:r>
-            <a:r>
-              <a:rPr lang="en-US" dirty="0" smtClean="0"/>
-              <a:t>. [DONE]</a:t>
-            </a:r>
-            <a:endParaRPr lang="en-US" dirty="0" smtClean="0"/>
+              <a:t>Expand Index for find() and remove() to handle multiple matches. [DONE]</a:t>
+            </a:r>
           </a:p>
           <a:p>
             <a:pPr marL="0" indent="0">
@@ -5045,13 +5030,8 @@
           <a:p>
             <a:r>
               <a:rPr lang="en-US" dirty="0" smtClean="0"/>
-              <a:t>Add Additional </a:t>
-            </a:r>
-            <a:r>
-              <a:rPr lang="en-US" dirty="0" smtClean="0"/>
-              <a:t>Getter/Setters [DONE]</a:t>
-            </a:r>
-            <a:endParaRPr lang="en-US" dirty="0" smtClean="0"/>
+              <a:t>Add Additional Getter/Setters [DONE]</a:t>
+            </a:r>
           </a:p>
           <a:p>
             <a:pPr lvl="1"/>
@@ -5176,11 +5156,7 @@
             </a:r>
             <a:r>
               <a:rPr lang="en-US" dirty="0" smtClean="0"/>
-              <a:t> </a:t>
-            </a:r>
-            <a:r>
-              <a:rPr lang="en-US" dirty="0" smtClean="0"/>
-              <a:t> [DONE]</a:t>
+              <a:t>  [DONE]</a:t>
             </a:r>
             <a:endParaRPr lang="en-US" dirty="0" smtClean="0">
               <a:solidFill>
@@ -5218,13 +5194,8 @@
           <a:p>
             <a:r>
               <a:rPr lang="en-US" dirty="0" smtClean="0"/>
-              <a:t>Add </a:t>
-            </a:r>
-            <a:r>
-              <a:rPr lang="en-US" dirty="0" smtClean="0"/>
-              <a:t>Tests [DONE]</a:t>
-            </a:r>
-            <a:endParaRPr lang="en-US" dirty="0" smtClean="0"/>
+              <a:t>Add Tests [DONE]</a:t>
+            </a:r>
           </a:p>
         </p:txBody>
       </p:sp>
@@ -5330,13 +5301,8 @@
           <a:p>
             <a:r>
               <a:rPr lang="en-US" dirty="0" smtClean="0"/>
-              <a:t>Add Where to Data </a:t>
-            </a:r>
-            <a:r>
-              <a:rPr lang="en-US" dirty="0" smtClean="0"/>
-              <a:t>Store [DONE]</a:t>
-            </a:r>
-            <a:endParaRPr lang="en-US" dirty="0" smtClean="0"/>
+              <a:t>Add Where to Data Store [DONE]</a:t>
+            </a:r>
           </a:p>
           <a:p>
             <a:pPr lvl="1"/>
@@ -5378,7 +5344,6 @@
               <a:rPr lang="en-US" dirty="0" smtClean="0"/>
               <a:t> [DONE]</a:t>
             </a:r>
-            <a:endParaRPr lang="en-US" dirty="0" smtClean="0"/>
           </a:p>
           <a:p>
             <a:pPr marL="0" indent="0">
@@ -5389,13 +5354,8 @@
           <a:p>
             <a:r>
               <a:rPr lang="en-US" dirty="0" smtClean="0"/>
-              <a:t>Add Rollback and Jump </a:t>
-            </a:r>
-            <a:r>
-              <a:rPr lang="en-US" dirty="0" smtClean="0"/>
-              <a:t>ahead [DONE]</a:t>
-            </a:r>
-            <a:endParaRPr lang="en-US" dirty="0" smtClean="0"/>
+              <a:t>Add Rollback and Jump ahead [DONE]</a:t>
+            </a:r>
           </a:p>
           <a:p>
             <a:pPr marL="0" indent="0">
@@ -5408,14 +5368,17 @@
           </a:p>
           <a:p>
             <a:r>
-              <a:rPr lang="en-US" smtClean="0"/>
-              <a:t>Test </a:t>
-            </a:r>
-            <a:r>
-              <a:rPr lang="en-US" smtClean="0"/>
-              <a:t>Extensively (100+ TCs) [ DONE]</a:t>
-            </a:r>
-            <a:endParaRPr lang="en-US" dirty="0" smtClean="0"/>
+              <a:rPr lang="en-US" dirty="0" smtClean="0"/>
+              <a:t>Test Extensively </a:t>
+            </a:r>
+            <a:r>
+              <a:rPr lang="en-US" smtClean="0"/>
+              <a:t>(200 </a:t>
+            </a:r>
+            <a:r>
+              <a:rPr lang="en-US" dirty="0" smtClean="0"/>
+              <a:t>TCs) [ DONE]</a:t>
+            </a:r>
           </a:p>
           <a:p>
             <a:pPr marL="517525" lvl="1" indent="0">

</xml_diff>